<commit_message>
Added solution to MaxSumSeqSkippingOne
</commit_message>
<xml_diff>
--- a/EBooks/Diagrams3.pptx
+++ b/EBooks/Diagrams3.pptx
@@ -6,6 +6,8 @@
   </p:sldMasterIdLst>
   <p:sldIdLst>
     <p:sldId id="257" r:id="rId2"/>
+    <p:sldId id="258" r:id="rId3"/>
+    <p:sldId id="259" r:id="rId4"/>
   </p:sldIdLst>
   <p:sldSz cx="9144000" cy="6858000" type="screen4x3"/>
   <p:notesSz cx="6858000" cy="9144000"/>
@@ -289,7 +291,7 @@
             <a:fld id="{1D8BD707-D9CF-40AE-B4C6-C98DA3205C09}" type="datetimeFigureOut">
               <a:rPr lang="en-US" smtClean="0"/>
               <a:pPr/>
-              <a:t>3/19/2018</a:t>
+              <a:t>3/21/2018</a:t>
             </a:fld>
             <a:endParaRPr lang="en-US"/>
           </a:p>
@@ -456,7 +458,7 @@
             <a:fld id="{1D8BD707-D9CF-40AE-B4C6-C98DA3205C09}" type="datetimeFigureOut">
               <a:rPr lang="en-US" smtClean="0"/>
               <a:pPr/>
-              <a:t>3/19/2018</a:t>
+              <a:t>3/21/2018</a:t>
             </a:fld>
             <a:endParaRPr lang="en-US"/>
           </a:p>
@@ -633,7 +635,7 @@
             <a:fld id="{1D8BD707-D9CF-40AE-B4C6-C98DA3205C09}" type="datetimeFigureOut">
               <a:rPr lang="en-US" smtClean="0"/>
               <a:pPr/>
-              <a:t>3/19/2018</a:t>
+              <a:t>3/21/2018</a:t>
             </a:fld>
             <a:endParaRPr lang="en-US"/>
           </a:p>
@@ -800,7 +802,7 @@
             <a:fld id="{1D8BD707-D9CF-40AE-B4C6-C98DA3205C09}" type="datetimeFigureOut">
               <a:rPr lang="en-US" smtClean="0"/>
               <a:pPr/>
-              <a:t>3/19/2018</a:t>
+              <a:t>3/21/2018</a:t>
             </a:fld>
             <a:endParaRPr lang="en-US"/>
           </a:p>
@@ -1043,7 +1045,7 @@
             <a:fld id="{1D8BD707-D9CF-40AE-B4C6-C98DA3205C09}" type="datetimeFigureOut">
               <a:rPr lang="en-US" smtClean="0"/>
               <a:pPr/>
-              <a:t>3/19/2018</a:t>
+              <a:t>3/21/2018</a:t>
             </a:fld>
             <a:endParaRPr lang="en-US"/>
           </a:p>
@@ -1328,7 +1330,7 @@
             <a:fld id="{1D8BD707-D9CF-40AE-B4C6-C98DA3205C09}" type="datetimeFigureOut">
               <a:rPr lang="en-US" smtClean="0"/>
               <a:pPr/>
-              <a:t>3/19/2018</a:t>
+              <a:t>3/21/2018</a:t>
             </a:fld>
             <a:endParaRPr lang="en-US"/>
           </a:p>
@@ -1747,7 +1749,7 @@
             <a:fld id="{1D8BD707-D9CF-40AE-B4C6-C98DA3205C09}" type="datetimeFigureOut">
               <a:rPr lang="en-US" smtClean="0"/>
               <a:pPr/>
-              <a:t>3/19/2018</a:t>
+              <a:t>3/21/2018</a:t>
             </a:fld>
             <a:endParaRPr lang="en-US"/>
           </a:p>
@@ -1862,7 +1864,7 @@
             <a:fld id="{1D8BD707-D9CF-40AE-B4C6-C98DA3205C09}" type="datetimeFigureOut">
               <a:rPr lang="en-US" smtClean="0"/>
               <a:pPr/>
-              <a:t>3/19/2018</a:t>
+              <a:t>3/21/2018</a:t>
             </a:fld>
             <a:endParaRPr lang="en-US"/>
           </a:p>
@@ -1954,7 +1956,7 @@
             <a:fld id="{1D8BD707-D9CF-40AE-B4C6-C98DA3205C09}" type="datetimeFigureOut">
               <a:rPr lang="en-US" smtClean="0"/>
               <a:pPr/>
-              <a:t>3/19/2018</a:t>
+              <a:t>3/21/2018</a:t>
             </a:fld>
             <a:endParaRPr lang="en-US"/>
           </a:p>
@@ -2228,7 +2230,7 @@
             <a:fld id="{1D8BD707-D9CF-40AE-B4C6-C98DA3205C09}" type="datetimeFigureOut">
               <a:rPr lang="en-US" smtClean="0"/>
               <a:pPr/>
-              <a:t>3/19/2018</a:t>
+              <a:t>3/21/2018</a:t>
             </a:fld>
             <a:endParaRPr lang="en-US"/>
           </a:p>
@@ -2478,7 +2480,7 @@
             <a:fld id="{1D8BD707-D9CF-40AE-B4C6-C98DA3205C09}" type="datetimeFigureOut">
               <a:rPr lang="en-US" smtClean="0"/>
               <a:pPr/>
-              <a:t>3/19/2018</a:t>
+              <a:t>3/21/2018</a:t>
             </a:fld>
             <a:endParaRPr lang="en-US"/>
           </a:p>
@@ -2688,7 +2690,7 @@
             <a:fld id="{1D8BD707-D9CF-40AE-B4C6-C98DA3205C09}" type="datetimeFigureOut">
               <a:rPr lang="en-US" smtClean="0"/>
               <a:pPr/>
-              <a:t>3/19/2018</a:t>
+              <a:t>3/21/2018</a:t>
             </a:fld>
             <a:endParaRPr lang="en-US"/>
           </a:p>
@@ -3207,6 +3209,213 @@
 </p:sld>
 </file>
 
+<file path=ppt/slides/slide2.xml><?xml version="1.0" encoding="utf-8"?>
+<p:sld xmlns:a="http://schemas.openxmlformats.org/drawingml/2006/main" xmlns:r="http://schemas.openxmlformats.org/officeDocument/2006/relationships" xmlns:p="http://schemas.openxmlformats.org/presentationml/2006/main">
+  <p:cSld>
+    <p:spTree>
+      <p:nvGrpSpPr>
+        <p:cNvPr id="1" name=""/>
+        <p:cNvGrpSpPr/>
+        <p:nvPr/>
+      </p:nvGrpSpPr>
+      <p:grpSpPr>
+        <a:xfrm>
+          <a:off x="0" y="0"/>
+          <a:ext cx="0" cy="0"/>
+          <a:chOff x="0" y="0"/>
+          <a:chExt cx="0" cy="0"/>
+        </a:xfrm>
+      </p:grpSpPr>
+      <p:grpSp>
+        <p:nvGrpSpPr>
+          <p:cNvPr id="7" name="Group 6"/>
+          <p:cNvGrpSpPr/>
+          <p:nvPr/>
+        </p:nvGrpSpPr>
+        <p:grpSpPr>
+          <a:xfrm>
+            <a:off x="534286" y="154171"/>
+            <a:ext cx="8075429" cy="3960629"/>
+            <a:chOff x="228600" y="228600"/>
+            <a:chExt cx="8075429" cy="3960629"/>
+          </a:xfrm>
+        </p:grpSpPr>
+        <p:pic>
+          <p:nvPicPr>
+            <p:cNvPr id="1030" name="Picture 6" descr="https://documents.lucidchart.com/documents/87761232-059a-4f58-9e74-e71b5e01a19b/pages/9zpmWE__Oh-N?a=722&amp;x=18&amp;y=18&amp;w=924&amp;h=924&amp;store=1&amp;accept=image%2F*&amp;auth=LCA%20db44ac347cdb0840389f9b78600318a82bb7ae34-ts%3D1521495877"/>
+            <p:cNvPicPr>
+              <a:picLocks noChangeAspect="1" noChangeArrowheads="1"/>
+            </p:cNvPicPr>
+            <p:nvPr/>
+          </p:nvPicPr>
+          <p:blipFill>
+            <a:blip r:embed="rId2" cstate="print"/>
+            <a:srcRect/>
+            <a:stretch>
+              <a:fillRect/>
+            </a:stretch>
+          </p:blipFill>
+          <p:spPr bwMode="auto">
+            <a:xfrm>
+              <a:off x="228600" y="228600"/>
+              <a:ext cx="3960629" cy="3960629"/>
+            </a:xfrm>
+            <a:prstGeom prst="rect">
+              <a:avLst/>
+            </a:prstGeom>
+            <a:noFill/>
+          </p:spPr>
+        </p:pic>
+        <p:pic>
+          <p:nvPicPr>
+            <p:cNvPr id="6" name="Picture 6" descr="https://documents.lucidchart.com/documents/87761232-059a-4f58-9e74-e71b5e01a19b/pages/9zpmWE__Oh-N?a=722&amp;x=18&amp;y=18&amp;w=924&amp;h=924&amp;store=1&amp;accept=image%2F*&amp;auth=LCA%20db44ac347cdb0840389f9b78600318a82bb7ae34-ts%3D1521495877"/>
+            <p:cNvPicPr>
+              <a:picLocks noChangeAspect="1" noChangeArrowheads="1"/>
+            </p:cNvPicPr>
+            <p:nvPr/>
+          </p:nvPicPr>
+          <p:blipFill>
+            <a:blip r:embed="rId2" cstate="print"/>
+            <a:srcRect/>
+            <a:stretch>
+              <a:fillRect/>
+            </a:stretch>
+          </p:blipFill>
+          <p:spPr bwMode="auto">
+            <a:xfrm>
+              <a:off x="4343400" y="228600"/>
+              <a:ext cx="3960629" cy="3960629"/>
+            </a:xfrm>
+            <a:prstGeom prst="rect">
+              <a:avLst/>
+            </a:prstGeom>
+            <a:noFill/>
+          </p:spPr>
+        </p:pic>
+      </p:grpSp>
+    </p:spTree>
+  </p:cSld>
+  <p:clrMapOvr>
+    <a:masterClrMapping/>
+  </p:clrMapOvr>
+</p:sld>
+</file>
+
+<file path=ppt/slides/slide3.xml><?xml version="1.0" encoding="utf-8"?>
+<p:sld xmlns:a="http://schemas.openxmlformats.org/drawingml/2006/main" xmlns:r="http://schemas.openxmlformats.org/officeDocument/2006/relationships" xmlns:p="http://schemas.openxmlformats.org/presentationml/2006/main">
+  <p:cSld>
+    <p:spTree>
+      <p:nvGrpSpPr>
+        <p:cNvPr id="1" name=""/>
+        <p:cNvGrpSpPr/>
+        <p:nvPr/>
+      </p:nvGrpSpPr>
+      <p:grpSpPr>
+        <a:xfrm>
+          <a:off x="0" y="0"/>
+          <a:ext cx="0" cy="0"/>
+          <a:chOff x="0" y="0"/>
+          <a:chExt cx="0" cy="0"/>
+        </a:xfrm>
+      </p:grpSpPr>
+      <p:pic>
+        <p:nvPicPr>
+          <p:cNvPr id="1026" name="Picture 2" descr="https://documents.lucidchart.com/documents/5c89c2be-d256-4656-8ecb-220f9c125152/pages/0_0?a=1454&amp;x=39&amp;y=43&amp;w=1045&amp;h=814&amp;store=1&amp;accept=image%2F*&amp;auth=LCA%20e59b34d7f2568dbc4f201ed7245933b2c73e3024-ts%3D1521658129"/>
+          <p:cNvPicPr>
+            <a:picLocks noChangeAspect="1" noChangeArrowheads="1"/>
+          </p:cNvPicPr>
+          <p:nvPr/>
+        </p:nvPicPr>
+        <p:blipFill>
+          <a:blip r:embed="rId2" cstate="print"/>
+          <a:srcRect/>
+          <a:stretch>
+            <a:fillRect/>
+          </a:stretch>
+        </p:blipFill>
+        <p:spPr bwMode="auto">
+          <a:xfrm>
+            <a:off x="3695700" y="2590800"/>
+            <a:ext cx="5375139" cy="4186950"/>
+          </a:xfrm>
+          <a:prstGeom prst="rect">
+            <a:avLst/>
+          </a:prstGeom>
+          <a:noFill/>
+        </p:spPr>
+      </p:pic>
+      <p:pic>
+        <p:nvPicPr>
+          <p:cNvPr id="1027" name="Picture 3"/>
+          <p:cNvPicPr>
+            <a:picLocks noChangeAspect="1" noChangeArrowheads="1"/>
+          </p:cNvPicPr>
+          <p:nvPr/>
+        </p:nvPicPr>
+        <p:blipFill>
+          <a:blip r:embed="rId3" cstate="print"/>
+          <a:srcRect/>
+          <a:stretch>
+            <a:fillRect/>
+          </a:stretch>
+        </p:blipFill>
+        <p:spPr bwMode="auto">
+          <a:xfrm>
+            <a:off x="152400" y="228600"/>
+            <a:ext cx="3886200" cy="2038350"/>
+          </a:xfrm>
+          <a:prstGeom prst="rect">
+            <a:avLst/>
+          </a:prstGeom>
+          <a:noFill/>
+          <a:ln w="9525">
+            <a:noFill/>
+            <a:miter lim="800000"/>
+            <a:headEnd/>
+            <a:tailEnd/>
+          </a:ln>
+        </p:spPr>
+      </p:pic>
+      <p:pic>
+        <p:nvPicPr>
+          <p:cNvPr id="1028" name="Picture 4"/>
+          <p:cNvPicPr>
+            <a:picLocks noChangeAspect="1" noChangeArrowheads="1"/>
+          </p:cNvPicPr>
+          <p:nvPr/>
+        </p:nvPicPr>
+        <p:blipFill>
+          <a:blip r:embed="rId4" cstate="print"/>
+          <a:srcRect/>
+          <a:stretch>
+            <a:fillRect/>
+          </a:stretch>
+        </p:blipFill>
+        <p:spPr bwMode="auto">
+          <a:xfrm>
+            <a:off x="304800" y="5105400"/>
+            <a:ext cx="3403870" cy="1447800"/>
+          </a:xfrm>
+          <a:prstGeom prst="rect">
+            <a:avLst/>
+          </a:prstGeom>
+          <a:noFill/>
+          <a:ln w="9525">
+            <a:noFill/>
+            <a:miter lim="800000"/>
+            <a:headEnd/>
+            <a:tailEnd/>
+          </a:ln>
+        </p:spPr>
+      </p:pic>
+    </p:spTree>
+  </p:cSld>
+  <p:clrMapOvr>
+    <a:masterClrMapping/>
+  </p:clrMapOvr>
+</p:sld>
+</file>
+
 <file path=ppt/theme/theme1.xml><?xml version="1.0" encoding="utf-8"?>
 <a:theme xmlns:a="http://schemas.openxmlformats.org/drawingml/2006/main" name="Office Theme">
   <a:themeElements>

</xml_diff>